<commit_message>
quick updates to Vagrant to AWS Flow Document
</commit_message>
<xml_diff>
--- a/docs/vagrant-to-aws-flow.pptx
+++ b/docs/vagrant-to-aws-flow.pptx
@@ -216,7 +216,7 @@
           <a:p>
             <a:fld id="{A450C1F5-2C3F-B741-83BF-BC37BFABE0EE}" type="datetimeFigureOut">
               <a:rPr lang="en-US" smtClean="0"/>
-              <a:t>3/15/16</a:t>
+              <a:t>3/16/16</a:t>
             </a:fld>
             <a:endParaRPr lang="en-US"/>
           </a:p>
@@ -783,7 +783,7 @@
           <a:p>
             <a:fld id="{C19944D5-0F61-0247-B8CD-7CECAD567576}" type="datetimeFigureOut">
               <a:rPr lang="en-US" smtClean="0"/>
-              <a:t>3/15/16</a:t>
+              <a:t>3/16/16</a:t>
             </a:fld>
             <a:endParaRPr lang="en-US"/>
           </a:p>
@@ -958,7 +958,7 @@
           <a:p>
             <a:fld id="{C19944D5-0F61-0247-B8CD-7CECAD567576}" type="datetimeFigureOut">
               <a:rPr lang="en-US" smtClean="0"/>
-              <a:t>3/15/16</a:t>
+              <a:t>3/16/16</a:t>
             </a:fld>
             <a:endParaRPr lang="en-US"/>
           </a:p>
@@ -1138,7 +1138,7 @@
           <a:p>
             <a:fld id="{C19944D5-0F61-0247-B8CD-7CECAD567576}" type="datetimeFigureOut">
               <a:rPr lang="en-US" smtClean="0"/>
-              <a:t>3/15/16</a:t>
+              <a:t>3/16/16</a:t>
             </a:fld>
             <a:endParaRPr lang="en-US"/>
           </a:p>
@@ -1313,7 +1313,7 @@
           <a:p>
             <a:fld id="{C19944D5-0F61-0247-B8CD-7CECAD567576}" type="datetimeFigureOut">
               <a:rPr lang="en-US" smtClean="0"/>
-              <a:t>3/15/16</a:t>
+              <a:t>3/16/16</a:t>
             </a:fld>
             <a:endParaRPr lang="en-US"/>
           </a:p>
@@ -1559,7 +1559,7 @@
           <a:p>
             <a:fld id="{C19944D5-0F61-0247-B8CD-7CECAD567576}" type="datetimeFigureOut">
               <a:rPr lang="en-US" smtClean="0"/>
-              <a:t>3/15/16</a:t>
+              <a:t>3/16/16</a:t>
             </a:fld>
             <a:endParaRPr lang="en-US"/>
           </a:p>
@@ -1796,7 +1796,7 @@
           <a:p>
             <a:fld id="{C19944D5-0F61-0247-B8CD-7CECAD567576}" type="datetimeFigureOut">
               <a:rPr lang="en-US" smtClean="0"/>
-              <a:t>3/15/16</a:t>
+              <a:t>3/16/16</a:t>
             </a:fld>
             <a:endParaRPr lang="en-US"/>
           </a:p>
@@ -2163,7 +2163,7 @@
           <a:p>
             <a:fld id="{C19944D5-0F61-0247-B8CD-7CECAD567576}" type="datetimeFigureOut">
               <a:rPr lang="en-US" smtClean="0"/>
-              <a:t>3/15/16</a:t>
+              <a:t>3/16/16</a:t>
             </a:fld>
             <a:endParaRPr lang="en-US"/>
           </a:p>
@@ -2281,7 +2281,7 @@
           <a:p>
             <a:fld id="{C19944D5-0F61-0247-B8CD-7CECAD567576}" type="datetimeFigureOut">
               <a:rPr lang="en-US" smtClean="0"/>
-              <a:t>3/15/16</a:t>
+              <a:t>3/16/16</a:t>
             </a:fld>
             <a:endParaRPr lang="en-US"/>
           </a:p>
@@ -2376,7 +2376,7 @@
           <a:p>
             <a:fld id="{C19944D5-0F61-0247-B8CD-7CECAD567576}" type="datetimeFigureOut">
               <a:rPr lang="en-US" smtClean="0"/>
-              <a:t>3/15/16</a:t>
+              <a:t>3/16/16</a:t>
             </a:fld>
             <a:endParaRPr lang="en-US"/>
           </a:p>
@@ -2653,7 +2653,7 @@
           <a:p>
             <a:fld id="{C19944D5-0F61-0247-B8CD-7CECAD567576}" type="datetimeFigureOut">
               <a:rPr lang="en-US" smtClean="0"/>
-              <a:t>3/15/16</a:t>
+              <a:t>3/16/16</a:t>
             </a:fld>
             <a:endParaRPr lang="en-US"/>
           </a:p>
@@ -2910,7 +2910,7 @@
           <a:p>
             <a:fld id="{C19944D5-0F61-0247-B8CD-7CECAD567576}" type="datetimeFigureOut">
               <a:rPr lang="en-US" smtClean="0"/>
-              <a:t>3/15/16</a:t>
+              <a:t>3/16/16</a:t>
             </a:fld>
             <a:endParaRPr lang="en-US"/>
           </a:p>
@@ -3123,7 +3123,7 @@
           <a:p>
             <a:fld id="{C19944D5-0F61-0247-B8CD-7CECAD567576}" type="datetimeFigureOut">
               <a:rPr lang="en-US" smtClean="0"/>
-              <a:t>3/15/16</a:t>
+              <a:t>3/16/16</a:t>
             </a:fld>
             <a:endParaRPr lang="en-US"/>
           </a:p>
@@ -4287,7 +4287,19 @@
             </a:br>
             <a:r>
               <a:rPr lang="en-US" i="1" dirty="0" smtClean="0"/>
-              <a:t>Act III – Building the Damn Thing</a:t>
+              <a:t>Act III – </a:t>
+            </a:r>
+            <a:r>
+              <a:rPr lang="en-US" i="1" dirty="0" smtClean="0"/>
+              <a:t>Running </a:t>
+            </a:r>
+            <a:r>
+              <a:rPr lang="en-US" i="1" dirty="0" smtClean="0"/>
+              <a:t>the </a:t>
+            </a:r>
+            <a:r>
+              <a:rPr lang="en-US" i="1" dirty="0" smtClean="0"/>
+              <a:t>Application</a:t>
             </a:r>
             <a:endParaRPr lang="en-US" i="1" dirty="0"/>
           </a:p>
@@ -4312,8 +4324,13 @@
           <a:p>
             <a:r>
               <a:rPr lang="en-US" dirty="0" smtClean="0"/>
-              <a:t>Developer 1, the FNG:</a:t>
-            </a:r>
+              <a:t>Developer </a:t>
+            </a:r>
+            <a:r>
+              <a:rPr lang="en-US" dirty="0" smtClean="0"/>
+              <a:t>1:</a:t>
+            </a:r>
+            <a:endParaRPr lang="en-US" dirty="0" smtClean="0"/>
           </a:p>
           <a:p>
             <a:pPr lvl="1"/>
@@ -4383,11 +4400,23 @@
             </a:r>
             <a:r>
               <a:rPr lang="en-US" dirty="0" err="1" smtClean="0"/>
-              <a:t>MariaDB</a:t>
-            </a:r>
-            <a:r>
-              <a:rPr lang="en-US" dirty="0" smtClean="0"/>
-              <a:t> and </a:t>
+              <a:t>MongoDB</a:t>
+            </a:r>
+            <a:r>
+              <a:rPr lang="en-US" dirty="0" smtClean="0"/>
+              <a:t>, </a:t>
+            </a:r>
+            <a:r>
+              <a:rPr lang="en-US" dirty="0" err="1" smtClean="0"/>
+              <a:t>InfluxDB</a:t>
+            </a:r>
+            <a:r>
+              <a:rPr lang="en-US" dirty="0" smtClean="0"/>
+              <a:t> </a:t>
+            </a:r>
+            <a:r>
+              <a:rPr lang="en-US" dirty="0" smtClean="0"/>
+              <a:t>and </a:t>
             </a:r>
             <a:r>
               <a:rPr lang="en-US" dirty="0" err="1" smtClean="0"/>
@@ -4395,8 +4424,13 @@
             </a:r>
             <a:r>
               <a:rPr lang="en-US" dirty="0" smtClean="0"/>
-              <a:t> installs as well?</a:t>
-            </a:r>
+              <a:t> installs as </a:t>
+            </a:r>
+            <a:r>
+              <a:rPr lang="en-US" dirty="0" smtClean="0"/>
+              <a:t>well :-)</a:t>
+            </a:r>
+            <a:endParaRPr lang="en-US" dirty="0" smtClean="0"/>
           </a:p>
         </p:txBody>
       </p:sp>
@@ -4630,16 +4664,25 @@
             </a:r>
             <a:r>
               <a:rPr lang="en-US" dirty="0" err="1" smtClean="0"/>
-              <a:t>symlink</a:t>
-            </a:r>
-            <a:r>
-              <a:rPr lang="en-US" dirty="0" smtClean="0"/>
-              <a:t> = not available in AWS – </a:t>
+              <a:t>synced_folder</a:t>
+            </a:r>
+            <a:r>
+              <a:rPr lang="en-US" dirty="0" smtClean="0"/>
+              <a:t> = </a:t>
+            </a:r>
+            <a:r>
+              <a:rPr lang="en-US" dirty="0" smtClean="0"/>
+              <a:t>not available in AWS – </a:t>
             </a:r>
             <a:r>
               <a:rPr lang="en-US" i="1" dirty="0" smtClean="0"/>
-              <a:t>you can still use, however</a:t>
-            </a:r>
+              <a:t>you can still </a:t>
+            </a:r>
+            <a:r>
+              <a:rPr lang="en-US" i="1" dirty="0" smtClean="0"/>
+              <a:t>use for software deployment</a:t>
+            </a:r>
+            <a:endParaRPr lang="en-US" i="1" dirty="0" smtClean="0"/>
           </a:p>
           <a:p>
             <a:pPr lvl="1"/>
@@ -4657,8 +4700,13 @@
             </a:r>
             <a:r>
               <a:rPr lang="en-US" i="1" dirty="0" smtClean="0"/>
-              <a:t>you can still use, however</a:t>
-            </a:r>
+              <a:t>you can still </a:t>
+            </a:r>
+            <a:r>
+              <a:rPr lang="en-US" i="1" dirty="0" smtClean="0"/>
+              <a:t>use for software deployment</a:t>
+            </a:r>
+            <a:endParaRPr lang="en-US" i="1" dirty="0" smtClean="0"/>
           </a:p>
         </p:txBody>
       </p:sp>
@@ -4752,11 +4800,19 @@
             </a:r>
             <a:r>
               <a:rPr lang="en-US" dirty="0" err="1" smtClean="0"/>
-              <a:t>vagrantfile</a:t>
-            </a:r>
-            <a:r>
-              <a:rPr lang="en-US" dirty="0" smtClean="0"/>
-              <a:t> in root directory of project</a:t>
+              <a:t>V</a:t>
+            </a:r>
+            <a:r>
+              <a:rPr lang="en-US" dirty="0" err="1" smtClean="0"/>
+              <a:t>agrantfile</a:t>
+            </a:r>
+            <a:r>
+              <a:rPr lang="en-US" dirty="0" smtClean="0"/>
+              <a:t> </a:t>
+            </a:r>
+            <a:r>
+              <a:rPr lang="en-US" dirty="0" smtClean="0"/>
+              <a:t>in root directory of project</a:t>
             </a:r>
           </a:p>
           <a:p>
@@ -4840,8 +4896,13 @@
             </a:r>
             <a:r>
               <a:rPr lang="en-US" i="1" dirty="0"/>
-              <a:t>, Chef, Puppet, Salt</a:t>
-            </a:r>
+              <a:t>, Chef, Puppet, </a:t>
+            </a:r>
+            <a:r>
+              <a:rPr lang="en-US" i="1" dirty="0" smtClean="0"/>
+              <a:t>Salt, etc.</a:t>
+            </a:r>
+            <a:endParaRPr lang="en-US" i="1" dirty="0"/>
           </a:p>
           <a:p>
             <a:r>
@@ -4924,7 +4985,7 @@
         <p:spPr/>
         <p:txBody>
           <a:bodyPr>
-            <a:normAutofit/>
+            <a:normAutofit lnSpcReduction="10000"/>
           </a:bodyPr>
           <a:lstStyle/>
           <a:p>
@@ -5002,8 +5063,13 @@
             </a:r>
             <a:r>
               <a:rPr lang="en-US" i="1" dirty="0" smtClean="0"/>
-              <a:t>, Chef, Puppet, Salt</a:t>
-            </a:r>
+              <a:t>, Chef, Puppet, </a:t>
+            </a:r>
+            <a:r>
+              <a:rPr lang="en-US" i="1" dirty="0" smtClean="0"/>
+              <a:t>Salt, etc.</a:t>
+            </a:r>
+            <a:endParaRPr lang="en-US" i="1" dirty="0" smtClean="0"/>
           </a:p>
           <a:p>
             <a:r>
@@ -5221,8 +5287,13 @@
             </a:pPr>
             <a:r>
               <a:rPr lang="en-US" dirty="0" smtClean="0"/>
-              <a:t>AWS Certified Solutions Architect – Associate Level</a:t>
-            </a:r>
+              <a:t>AWS Certified Solutions Architect – Associate </a:t>
+            </a:r>
+            <a:r>
+              <a:rPr lang="en-US" dirty="0" smtClean="0"/>
+              <a:t>Level (Number 224)</a:t>
+            </a:r>
+            <a:endParaRPr lang="en-US" dirty="0" smtClean="0"/>
           </a:p>
           <a:p>
             <a:pPr marL="800100" lvl="1" indent="-342900" algn="l">
@@ -5231,8 +5302,29 @@
             </a:pPr>
             <a:r>
               <a:rPr lang="en-US" dirty="0" smtClean="0"/>
-              <a:t>AWS System Operations – Associate Level</a:t>
-            </a:r>
+              <a:t>AWS </a:t>
+            </a:r>
+            <a:r>
+              <a:rPr lang="en-US" dirty="0" smtClean="0"/>
+              <a:t>Certified </a:t>
+            </a:r>
+            <a:r>
+              <a:rPr lang="en-US" dirty="0" err="1" smtClean="0"/>
+              <a:t>SysOps</a:t>
+            </a:r>
+            <a:r>
+              <a:rPr lang="en-US" dirty="0" smtClean="0"/>
+              <a:t> Administrator – </a:t>
+            </a:r>
+            <a:r>
+              <a:rPr lang="en-US" dirty="0" smtClean="0"/>
+              <a:t>Associate </a:t>
+            </a:r>
+            <a:r>
+              <a:rPr lang="en-US" dirty="0" smtClean="0"/>
+              <a:t>Level (Number 2564)</a:t>
+            </a:r>
+            <a:endParaRPr lang="en-US" dirty="0" smtClean="0"/>
           </a:p>
           <a:p>
             <a:pPr marL="342900" indent="-342900" algn="l">

</xml_diff>